<commit_message>
Added screenshot photo for readme.md
</commit_message>
<xml_diff>
--- a/images/docker_single_machine.pptx
+++ b/images/docker_single_machine.pptx
@@ -104,6 +104,11 @@
       </a:defRPr>
     </a:lvl9pPr>
   </p:defaultTextStyle>
+  <p:extLst>
+    <p:ext uri="{EFAFB233-063F-42B5-8137-9DF3F51BA10A}">
+      <p15:sldGuideLst xmlns:p15="http://schemas.microsoft.com/office/powerpoint/2012/main"/>
+    </p:ext>
+  </p:extLst>
 </p:presentation>
 </file>
 
@@ -5212,8 +5217,8 @@
         </p:nvCxnSpPr>
         <p:spPr>
           <a:xfrm flipH="1" flipV="1">
-            <a:off x="4728492" y="5333309"/>
-            <a:ext cx="5579200" cy="453805"/>
+            <a:off x="1556446" y="5299701"/>
+            <a:ext cx="8751246" cy="487413"/>
           </a:xfrm>
           <a:prstGeom prst="line">
             <a:avLst/>

</xml_diff>